<commit_message>
Starting on Rule SD1002
</commit_message>
<xml_diff>
--- a/images/ImageSources.pptx
+++ b/images/ImageSources.pptx
@@ -278,7 +278,7 @@
           <a:p>
             <a:fld id="{03ABD037-9D82-4436-AC70-ED75D2FE9417}" type="datetimeFigureOut">
               <a:rPr lang="en-US" smtClean="0"/>
-              <a:t>2/11/2020</a:t>
+              <a:t>2/14/2020</a:t>
             </a:fld>
             <a:endParaRPr lang="en-US"/>
           </a:p>
@@ -446,7 +446,7 @@
           <a:p>
             <a:fld id="{03ABD037-9D82-4436-AC70-ED75D2FE9417}" type="datetimeFigureOut">
               <a:rPr lang="en-US" smtClean="0"/>
-              <a:t>2/11/2020</a:t>
+              <a:t>2/14/2020</a:t>
             </a:fld>
             <a:endParaRPr lang="en-US"/>
           </a:p>
@@ -624,7 +624,7 @@
           <a:p>
             <a:fld id="{03ABD037-9D82-4436-AC70-ED75D2FE9417}" type="datetimeFigureOut">
               <a:rPr lang="en-US" smtClean="0"/>
-              <a:t>2/11/2020</a:t>
+              <a:t>2/14/2020</a:t>
             </a:fld>
             <a:endParaRPr lang="en-US"/>
           </a:p>
@@ -792,7 +792,7 @@
           <a:p>
             <a:fld id="{03ABD037-9D82-4436-AC70-ED75D2FE9417}" type="datetimeFigureOut">
               <a:rPr lang="en-US" smtClean="0"/>
-              <a:t>2/11/2020</a:t>
+              <a:t>2/14/2020</a:t>
             </a:fld>
             <a:endParaRPr lang="en-US"/>
           </a:p>
@@ -1037,7 +1037,7 @@
           <a:p>
             <a:fld id="{03ABD037-9D82-4436-AC70-ED75D2FE9417}" type="datetimeFigureOut">
               <a:rPr lang="en-US" smtClean="0"/>
-              <a:t>2/11/2020</a:t>
+              <a:t>2/14/2020</a:t>
             </a:fld>
             <a:endParaRPr lang="en-US"/>
           </a:p>
@@ -1266,7 +1266,7 @@
           <a:p>
             <a:fld id="{03ABD037-9D82-4436-AC70-ED75D2FE9417}" type="datetimeFigureOut">
               <a:rPr lang="en-US" smtClean="0"/>
-              <a:t>2/11/2020</a:t>
+              <a:t>2/14/2020</a:t>
             </a:fld>
             <a:endParaRPr lang="en-US"/>
           </a:p>
@@ -1630,7 +1630,7 @@
           <a:p>
             <a:fld id="{03ABD037-9D82-4436-AC70-ED75D2FE9417}" type="datetimeFigureOut">
               <a:rPr lang="en-US" smtClean="0"/>
-              <a:t>2/11/2020</a:t>
+              <a:t>2/14/2020</a:t>
             </a:fld>
             <a:endParaRPr lang="en-US"/>
           </a:p>
@@ -1747,7 +1747,7 @@
           <a:p>
             <a:fld id="{03ABD037-9D82-4436-AC70-ED75D2FE9417}" type="datetimeFigureOut">
               <a:rPr lang="en-US" smtClean="0"/>
-              <a:t>2/11/2020</a:t>
+              <a:t>2/14/2020</a:t>
             </a:fld>
             <a:endParaRPr lang="en-US"/>
           </a:p>
@@ -1842,7 +1842,7 @@
           <a:p>
             <a:fld id="{03ABD037-9D82-4436-AC70-ED75D2FE9417}" type="datetimeFigureOut">
               <a:rPr lang="en-US" smtClean="0"/>
-              <a:t>2/11/2020</a:t>
+              <a:t>2/14/2020</a:t>
             </a:fld>
             <a:endParaRPr lang="en-US"/>
           </a:p>
@@ -2117,7 +2117,7 @@
           <a:p>
             <a:fld id="{03ABD037-9D82-4436-AC70-ED75D2FE9417}" type="datetimeFigureOut">
               <a:rPr lang="en-US" smtClean="0"/>
-              <a:t>2/11/2020</a:t>
+              <a:t>2/14/2020</a:t>
             </a:fld>
             <a:endParaRPr lang="en-US"/>
           </a:p>
@@ -2369,7 +2369,7 @@
           <a:p>
             <a:fld id="{03ABD037-9D82-4436-AC70-ED75D2FE9417}" type="datetimeFigureOut">
               <a:rPr lang="en-US" smtClean="0"/>
-              <a:t>2/11/2020</a:t>
+              <a:t>2/14/2020</a:t>
             </a:fld>
             <a:endParaRPr lang="en-US"/>
           </a:p>
@@ -2580,7 +2580,7 @@
           <a:p>
             <a:fld id="{03ABD037-9D82-4436-AC70-ED75D2FE9417}" type="datetimeFigureOut">
               <a:rPr lang="en-US" smtClean="0"/>
-              <a:t>2/11/2020</a:t>
+              <a:t>2/14/2020</a:t>
             </a:fld>
             <a:endParaRPr lang="en-US"/>
           </a:p>
@@ -13834,8 +13834,8 @@
         </p:nvSpPr>
         <p:spPr>
           <a:xfrm>
-            <a:off x="533513" y="602691"/>
-            <a:ext cx="2971800" cy="449588"/>
+            <a:off x="716393" y="602691"/>
+            <a:ext cx="2286000" cy="365760"/>
           </a:xfrm>
           <a:prstGeom prst="roundRect">
             <a:avLst/>
@@ -13876,7 +13876,17 @@
                   <a:schemeClr val="tx1"/>
                 </a:solidFill>
               </a:rPr>
-              <a:t>cj16050:Animal_184f16eb</a:t>
+              <a:t>cj16050:Animal_</a:t>
+            </a:r>
+            <a:r>
+              <a:rPr lang="en-US" b="1" dirty="0">
+                <a:solidFill>
+                  <a:schemeClr val="bg1">
+                    <a:lumMod val="65000"/>
+                  </a:schemeClr>
+                </a:solidFill>
+              </a:rPr>
+              <a:t>xxxx</a:t>
             </a:r>
           </a:p>
         </p:txBody>
@@ -13895,8 +13905,8 @@
         </p:nvSpPr>
         <p:spPr>
           <a:xfrm>
-            <a:off x="5872963" y="161662"/>
-            <a:ext cx="2971800" cy="457001"/>
+            <a:off x="5352700" y="161662"/>
+            <a:ext cx="2194560" cy="365760"/>
           </a:xfrm>
           <a:prstGeom prst="roundRect">
             <a:avLst/>
@@ -13967,8 +13977,8 @@
         </p:nvCxnSpPr>
         <p:spPr>
           <a:xfrm flipV="1">
-            <a:off x="3505313" y="390163"/>
-            <a:ext cx="2367650" cy="437322"/>
+            <a:off x="3002393" y="344542"/>
+            <a:ext cx="2350307" cy="441029"/>
           </a:xfrm>
           <a:prstGeom prst="straightConnector1">
             <a:avLst/>
@@ -14011,8 +14021,8 @@
         </p:nvSpPr>
         <p:spPr>
           <a:xfrm>
-            <a:off x="5872963" y="1972158"/>
-            <a:ext cx="2971800" cy="457001"/>
+            <a:off x="5352700" y="1972158"/>
+            <a:ext cx="2560320" cy="365760"/>
           </a:xfrm>
           <a:prstGeom prst="roundRect">
             <a:avLst/>
@@ -14083,8 +14093,8 @@
         </p:nvCxnSpPr>
         <p:spPr>
           <a:xfrm>
-            <a:off x="3505313" y="2200659"/>
-            <a:ext cx="2367650" cy="0"/>
+            <a:off x="3002393" y="2155038"/>
+            <a:ext cx="2350307" cy="0"/>
           </a:xfrm>
           <a:prstGeom prst="straightConnector1">
             <a:avLst/>
@@ -14131,8 +14141,8 @@
         </p:nvCxnSpPr>
         <p:spPr>
           <a:xfrm>
-            <a:off x="2019413" y="2429159"/>
-            <a:ext cx="2590135" cy="852065"/>
+            <a:off x="1859393" y="2337918"/>
+            <a:ext cx="2590135" cy="943306"/>
           </a:xfrm>
           <a:prstGeom prst="straightConnector1">
             <a:avLst/>
@@ -14175,10 +14185,10 @@
         </p:nvGrpSpPr>
         <p:grpSpPr>
           <a:xfrm>
-            <a:off x="377759" y="1052279"/>
-            <a:ext cx="3843362" cy="919879"/>
-            <a:chOff x="240958" y="1052279"/>
-            <a:chExt cx="3843362" cy="919879"/>
+            <a:off x="377759" y="968451"/>
+            <a:ext cx="3843362" cy="1003707"/>
+            <a:chOff x="240958" y="968451"/>
+            <a:chExt cx="3843362" cy="1003707"/>
           </a:xfrm>
         </p:grpSpPr>
         <p:cxnSp>
@@ -14199,8 +14209,8 @@
           </p:nvCxnSpPr>
           <p:spPr>
             <a:xfrm>
-              <a:off x="1882612" y="1052279"/>
-              <a:ext cx="0" cy="919879"/>
+              <a:off x="1722592" y="968451"/>
+              <a:ext cx="0" cy="1003707"/>
             </a:xfrm>
             <a:prstGeom prst="straightConnector1">
               <a:avLst/>
@@ -14356,8 +14366,8 @@
         </p:nvCxnSpPr>
         <p:spPr>
           <a:xfrm>
-            <a:off x="2019413" y="2429159"/>
-            <a:ext cx="0" cy="2495037"/>
+            <a:off x="1859393" y="2337918"/>
+            <a:ext cx="0" cy="2586278"/>
           </a:xfrm>
           <a:prstGeom prst="straightConnector1">
             <a:avLst/>
@@ -14401,7 +14411,7 @@
         <p:spPr>
           <a:xfrm>
             <a:off x="3123648" y="3281224"/>
-            <a:ext cx="2971800" cy="457001"/>
+            <a:ext cx="2651760" cy="365760"/>
           </a:xfrm>
           <a:prstGeom prst="roundRect">
             <a:avLst/>
@@ -14462,7 +14472,7 @@
         <p:spPr>
           <a:xfrm>
             <a:off x="533513" y="4924196"/>
-            <a:ext cx="2971800" cy="457001"/>
+            <a:ext cx="2651760" cy="365760"/>
           </a:xfrm>
           <a:prstGeom prst="roundRect">
             <a:avLst/>
@@ -14523,7 +14533,7 @@
         <p:spPr>
           <a:xfrm>
             <a:off x="7811472" y="2830120"/>
-            <a:ext cx="2971800" cy="457001"/>
+            <a:ext cx="2286000" cy="365760"/>
           </a:xfrm>
           <a:prstGeom prst="roundRect">
             <a:avLst/>
@@ -14591,7 +14601,7 @@
         <p:spPr>
           <a:xfrm>
             <a:off x="5352700" y="4698445"/>
-            <a:ext cx="2971800" cy="457001"/>
+            <a:ext cx="2194560" cy="365760"/>
           </a:xfrm>
           <a:prstGeom prst="roundRect">
             <a:avLst/>
@@ -14662,8 +14672,8 @@
         </p:nvCxnSpPr>
         <p:spPr>
           <a:xfrm flipV="1">
-            <a:off x="6095448" y="3058621"/>
-            <a:ext cx="1716024" cy="451104"/>
+            <a:off x="5775408" y="3013000"/>
+            <a:ext cx="2036064" cy="451104"/>
           </a:xfrm>
           <a:prstGeom prst="straightConnector1">
             <a:avLst/>
@@ -14710,8 +14720,8 @@
         </p:nvCxnSpPr>
         <p:spPr>
           <a:xfrm flipV="1">
-            <a:off x="3505313" y="4926946"/>
-            <a:ext cx="1847387" cy="225751"/>
+            <a:off x="3185273" y="4881325"/>
+            <a:ext cx="2167427" cy="225751"/>
           </a:xfrm>
           <a:prstGeom prst="straightConnector1">
             <a:avLst/>
@@ -14758,8 +14768,8 @@
         </p:nvCxnSpPr>
         <p:spPr>
           <a:xfrm>
-            <a:off x="6095448" y="3509725"/>
-            <a:ext cx="1724641" cy="729655"/>
+            <a:off x="5775408" y="3464104"/>
+            <a:ext cx="2044681" cy="729655"/>
           </a:xfrm>
           <a:prstGeom prst="straightConnector1">
             <a:avLst/>
@@ -14803,13 +14813,13 @@
         <p:spPr>
           <a:xfrm>
             <a:off x="7820089" y="4010879"/>
-            <a:ext cx="2971800" cy="457001"/>
+            <a:ext cx="2560320" cy="365760"/>
           </a:xfrm>
           <a:prstGeom prst="roundRect">
             <a:avLst/>
           </a:prstGeom>
           <a:solidFill>
-            <a:schemeClr val="bg1"/>
+            <a:srgbClr val="FFFF00"/>
           </a:solidFill>
           <a:ln>
             <a:solidFill>
@@ -14844,7 +14854,23 @@
                   <a:schemeClr val="tx1"/>
                 </a:solidFill>
               </a:rPr>
-              <a:t>“2016-12-07”</a:t>
+              <a:t>“</a:t>
+            </a:r>
+            <a:r>
+              <a:rPr lang="en-US" b="1" dirty="0">
+                <a:solidFill>
+                  <a:srgbClr val="C00000"/>
+                </a:solidFill>
+              </a:rPr>
+              <a:t>2016-12-07</a:t>
+            </a:r>
+            <a:r>
+              <a:rPr lang="en-US" b="1" dirty="0">
+                <a:solidFill>
+                  <a:schemeClr val="tx1"/>
+                </a:solidFill>
+              </a:rPr>
+              <a:t>”</a:t>
             </a:r>
             <a:r>
               <a:rPr lang="en-US" b="1" dirty="0">
@@ -14890,14 +14916,14 @@
         </p:nvSpPr>
         <p:spPr>
           <a:xfrm>
-            <a:off x="5405023" y="5868679"/>
-            <a:ext cx="2971800" cy="457001"/>
+            <a:off x="5352700" y="5868679"/>
+            <a:ext cx="2560320" cy="365760"/>
           </a:xfrm>
           <a:prstGeom prst="roundRect">
             <a:avLst/>
           </a:prstGeom>
           <a:solidFill>
-            <a:schemeClr val="bg1"/>
+            <a:srgbClr val="FFFF00"/>
           </a:solidFill>
           <a:ln>
             <a:solidFill>
@@ -14932,7 +14958,23 @@
                   <a:schemeClr val="tx1"/>
                 </a:solidFill>
               </a:rPr>
-              <a:t>“2016-12-06”</a:t>
+              <a:t>“</a:t>
+            </a:r>
+            <a:r>
+              <a:rPr lang="en-US" b="1" dirty="0">
+                <a:solidFill>
+                  <a:srgbClr val="C00000"/>
+                </a:solidFill>
+              </a:rPr>
+              <a:t>2016-12-06</a:t>
+            </a:r>
+            <a:r>
+              <a:rPr lang="en-US" b="1" dirty="0">
+                <a:solidFill>
+                  <a:schemeClr val="tx1"/>
+                </a:solidFill>
+              </a:rPr>
+              <a:t>”</a:t>
             </a:r>
             <a:r>
               <a:rPr lang="en-US" b="1" dirty="0">
@@ -14982,8 +15024,8 @@
         </p:nvCxnSpPr>
         <p:spPr>
           <a:xfrm>
-            <a:off x="3505313" y="5152697"/>
-            <a:ext cx="1899710" cy="944483"/>
+            <a:off x="3185273" y="5107076"/>
+            <a:ext cx="2167427" cy="944483"/>
           </a:xfrm>
           <a:prstGeom prst="straightConnector1">
             <a:avLst/>
@@ -15026,8 +15068,8 @@
         </p:nvSpPr>
         <p:spPr>
           <a:xfrm>
-            <a:off x="533513" y="1972158"/>
-            <a:ext cx="2971800" cy="457001"/>
+            <a:off x="716393" y="1972158"/>
+            <a:ext cx="2286000" cy="365760"/>
           </a:xfrm>
           <a:prstGeom prst="roundRect">
             <a:avLst/>
@@ -15068,7 +15110,17 @@
                   <a:schemeClr val="tx1"/>
                 </a:solidFill>
               </a:rPr>
-              <a:t>cj16050:Interval_ 184f16eb</a:t>
+              <a:t>cj16050:Interval_</a:t>
+            </a:r>
+            <a:r>
+              <a:rPr lang="en-US" b="1" dirty="0">
+                <a:solidFill>
+                  <a:schemeClr val="bg1">
+                    <a:lumMod val="65000"/>
+                  </a:schemeClr>
+                </a:solidFill>
+              </a:rPr>
+              <a:t>xxxx</a:t>
             </a:r>
           </a:p>
         </p:txBody>
@@ -15087,7 +15139,7 @@
         </p:nvSpPr>
         <p:spPr>
           <a:xfrm flipH="1">
-            <a:off x="4614859" y="462766"/>
+            <a:off x="4600344" y="288595"/>
             <a:ext cx="329184" cy="369332"/>
           </a:xfrm>
           <a:prstGeom prst="rect">
@@ -15139,7 +15191,7 @@
         </p:nvSpPr>
         <p:spPr>
           <a:xfrm flipH="1">
-            <a:off x="4658591" y="2017776"/>
+            <a:off x="4368305" y="1959719"/>
             <a:ext cx="352321" cy="369332"/>
           </a:xfrm>
           <a:prstGeom prst="rect">
@@ -15243,7 +15295,7 @@
         </p:nvSpPr>
         <p:spPr>
           <a:xfrm flipH="1">
-            <a:off x="4422109" y="4846950"/>
+            <a:off x="4335023" y="4759864"/>
             <a:ext cx="327937" cy="369332"/>
           </a:xfrm>
           <a:prstGeom prst="rect">
@@ -15349,7 +15401,7 @@
         </p:nvSpPr>
         <p:spPr>
           <a:xfrm>
-            <a:off x="6306516" y="3589072"/>
+            <a:off x="6175888" y="3545529"/>
             <a:ext cx="2114681" cy="369332"/>
           </a:xfrm>
           <a:prstGeom prst="rect">
@@ -15461,7 +15513,7 @@
         <p:spPr>
           <a:xfrm>
             <a:off x="7811472" y="1250296"/>
-            <a:ext cx="2971800" cy="457001"/>
+            <a:ext cx="2743200" cy="365760"/>
           </a:xfrm>
           <a:prstGeom prst="roundRect">
             <a:avLst/>
@@ -15502,7 +15554,25 @@
                   <a:schemeClr val="tx1"/>
                 </a:solidFill>
               </a:rPr>
-              <a:t>“Animal 99T1”</a:t>
+              <a:t>“Animal </a:t>
+            </a:r>
+            <a:r>
+              <a:rPr lang="en-US" b="1" dirty="0" err="1">
+                <a:solidFill>
+                  <a:schemeClr val="bg1">
+                    <a:lumMod val="65000"/>
+                  </a:schemeClr>
+                </a:solidFill>
+              </a:rPr>
+              <a:t>xxxx</a:t>
+            </a:r>
+            <a:r>
+              <a:rPr lang="en-US" b="1" dirty="0">
+                <a:solidFill>
+                  <a:schemeClr val="tx1"/>
+                </a:solidFill>
+              </a:rPr>
+              <a:t>”</a:t>
             </a:r>
             <a:r>
               <a:rPr lang="en-US" b="1" dirty="0">
@@ -15552,8 +15622,8 @@
         </p:nvCxnSpPr>
         <p:spPr>
           <a:xfrm>
-            <a:off x="3505313" y="827485"/>
-            <a:ext cx="4306159" cy="651312"/>
+            <a:off x="3002393" y="785571"/>
+            <a:ext cx="4809079" cy="647605"/>
           </a:xfrm>
           <a:prstGeom prst="straightConnector1">
             <a:avLst/>

</xml_diff>